<commit_message>
Added files and made minor changes
- Added missing compiled binaries
- Fixed some translation problems in YASS_EN presentation
</commit_message>
<xml_diff>
--- a/docs/YASS_EN.pptx
+++ b/docs/YASS_EN.pptx
@@ -4259,7 +4259,6 @@
               <a:rPr lang="en-GB" dirty="0"/>
               <a:t>Code structure</a:t>
             </a:r>
-            <a:endParaRPr lang="en-GB" dirty="0"/>
           </a:p>
         </p:txBody>
       </p:sp>
@@ -4609,11 +4608,7 @@
           <a:p>
             <a:r>
               <a:rPr lang="pt-PT" dirty="0" err="1" smtClean="0"/>
-              <a:t>Third-part</a:t>
-            </a:r>
-            <a:r>
-              <a:rPr lang="pt-PT" dirty="0" err="1" smtClean="0"/>
-              <a:t>y</a:t>
+              <a:t>Third-party</a:t>
             </a:r>
             <a:r>
               <a:rPr lang="pt-PT" dirty="0" smtClean="0"/>
@@ -4683,7 +4678,6 @@
               <a:rPr lang="en-GB" dirty="0" smtClean="0"/>
               <a:t>Supports a good variety of image types</a:t>
             </a:r>
-            <a:endParaRPr lang="en-GB" dirty="0" smtClean="0"/>
           </a:p>
         </p:txBody>
       </p:sp>
@@ -4740,8 +4734,24 @@
           <a:lstStyle/>
           <a:p>
             <a:r>
+              <a:rPr lang="pt-PT" dirty="0" err="1"/>
+              <a:t>Third-party</a:t>
+            </a:r>
+            <a:r>
               <a:rPr lang="pt-PT" dirty="0"/>
-              <a:t>Bibliotecas externas utilizadas</a:t>
+              <a:t> </a:t>
+            </a:r>
+            <a:r>
+              <a:rPr lang="pt-PT" dirty="0" err="1"/>
+              <a:t>libs</a:t>
+            </a:r>
+            <a:r>
+              <a:rPr lang="pt-PT" dirty="0"/>
+              <a:t> </a:t>
+            </a:r>
+            <a:r>
+              <a:rPr lang="pt-PT" dirty="0" err="1"/>
+              <a:t>used</a:t>
             </a:r>
             <a:endParaRPr lang="en-GB" dirty="0"/>
           </a:p>
@@ -5410,11 +5420,7 @@
           <a:p>
             <a:r>
               <a:rPr lang="en-GB" dirty="0" smtClean="0"/>
-              <a:t>Time </a:t>
-            </a:r>
-            <a:r>
-              <a:rPr lang="en-GB" dirty="0" smtClean="0"/>
-              <a:t>measurement</a:t>
+              <a:t>Time measurement</a:t>
             </a:r>
             <a:endParaRPr lang="en-GB" dirty="0"/>
           </a:p>
@@ -5465,7 +5471,6 @@
               <a:rPr lang="en-US" dirty="0" smtClean="0"/>
               <a:t> indicates the number of days since the beginning of the simulation</a:t>
             </a:r>
-            <a:endParaRPr lang="en-US" dirty="0" smtClean="0"/>
           </a:p>
           <a:p>
             <a:pPr marL="0" indent="0">
@@ -5999,13 +6004,8 @@
             <a:pPr lvl="1"/>
             <a:r>
               <a:rPr lang="en-GB" sz="2000" dirty="0" smtClean="0"/>
-              <a:t>Simulated sizes, distance and speed close to </a:t>
-            </a:r>
-            <a:r>
-              <a:rPr lang="en-GB" sz="2000" dirty="0" smtClean="0"/>
-              <a:t>reality</a:t>
-            </a:r>
-            <a:endParaRPr lang="en-GB" sz="2000" dirty="0" smtClean="0"/>
+              <a:t>Simulated sizes, distance and speed close to reality</a:t>
+            </a:r>
           </a:p>
           <a:p>
             <a:pPr lvl="1"/>
@@ -6018,9 +6018,12 @@
             <a:pPr lvl="1"/>
             <a:r>
               <a:rPr lang="en-GB" sz="2000" dirty="0" smtClean="0"/>
-              <a:t>Camera repositioning using the mouse</a:t>
-            </a:r>
-            <a:endParaRPr lang="en-GB" sz="2000" dirty="0" smtClean="0"/>
+              <a:t>Camera </a:t>
+            </a:r>
+            <a:r>
+              <a:rPr lang="en-GB" sz="2000" dirty="0" smtClean="0"/>
+              <a:t>repositioning using the mouse</a:t>
+            </a:r>
           </a:p>
           <a:p>
             <a:pPr lvl="1"/>
@@ -6032,12 +6035,8 @@
           <a:p>
             <a:pPr lvl="1"/>
             <a:r>
-              <a:rPr lang="en-GB" sz="2000" dirty="0" smtClean="0"/>
-              <a:t>Texture the sun, earth moon </a:t>
-            </a:r>
-            <a:r>
-              <a:rPr lang="en-GB" sz="2000" dirty="0" smtClean="0"/>
-              <a:t>and remaining planets</a:t>
+              <a:rPr lang="en-GB" smtClean="0"/>
+              <a:t>Textures</a:t>
             </a:r>
             <a:endParaRPr lang="en-GB" dirty="0"/>
           </a:p>
@@ -6150,7 +6149,6 @@
               <a:rPr lang="en-GB" dirty="0"/>
               <a:t>Implementation</a:t>
             </a:r>
-            <a:endParaRPr lang="en-GB" dirty="0"/>
           </a:p>
         </p:txBody>
       </p:sp>
@@ -6190,13 +6188,8 @@
             <a:pPr lvl="1"/>
             <a:r>
               <a:rPr lang="en-GB" dirty="0" smtClean="0"/>
-              <a:t>Render the rings of Saturn, using </a:t>
-            </a:r>
-            <a:r>
-              <a:rPr lang="en-GB" dirty="0" smtClean="0"/>
-              <a:t>a single texture and alpha blending</a:t>
-            </a:r>
-            <a:endParaRPr lang="en-GB" dirty="0" smtClean="0"/>
+              <a:t>Render the rings of Saturn, using a single texture and alpha blending</a:t>
+            </a:r>
           </a:p>
           <a:p>
             <a:pPr lvl="1"/>
@@ -6216,13 +6209,8 @@
             <a:pPr lvl="1"/>
             <a:r>
               <a:rPr lang="en-GB" dirty="0" smtClean="0"/>
-              <a:t>Earth atmosphere, alpha blended and independent from </a:t>
-            </a:r>
-            <a:r>
-              <a:rPr lang="en-GB" dirty="0" smtClean="0"/>
-              <a:t>Earth rotation</a:t>
-            </a:r>
-            <a:endParaRPr lang="en-GB" dirty="0" smtClean="0"/>
+              <a:t>Earth atmosphere, alpha blended and independent from Earth rotation</a:t>
+            </a:r>
           </a:p>
           <a:p>
             <a:pPr lvl="1"/>
@@ -6576,11 +6564,7 @@
             </a:r>
             <a:r>
               <a:rPr lang="pt-PT" dirty="0" smtClean="0"/>
-              <a:t> </a:t>
-            </a:r>
-            <a:r>
-              <a:rPr lang="pt-PT" dirty="0" smtClean="0"/>
-              <a:t>“</a:t>
+              <a:t> “</a:t>
             </a:r>
             <a:r>
               <a:rPr lang="en-GB" dirty="0" smtClean="0"/>
@@ -6592,11 +6576,7 @@
             </a:r>
             <a:r>
               <a:rPr lang="en-GB" dirty="0" smtClean="0"/>
-              <a:t>types”, GOOGLE IT! ( </a:t>
-            </a:r>
-            <a:r>
-              <a:rPr lang="en-GB" dirty="0" smtClean="0"/>
-              <a:t>ref: </a:t>
+              <a:t>types”, GOOGLE IT! ( ref: </a:t>
             </a:r>
             <a:r>
               <a:rPr lang="en-GB" dirty="0">
@@ -6618,13 +6598,8 @@
           <a:p>
             <a:r>
               <a:rPr lang="en-GB" dirty="0" smtClean="0"/>
-              <a:t>In a nutshell</a:t>
-            </a:r>
-            <a:r>
-              <a:rPr lang="en-GB" dirty="0" smtClean="0"/>
-              <a:t>, it consists in hiding the members of a given structure, providing functions that know how to interact with the structure data, thereby achieving a perfect encapsulation of the underlying information </a:t>
-            </a:r>
-            <a:endParaRPr lang="en-GB" dirty="0" smtClean="0"/>
+              <a:t>In a nutshell, it consists in hiding the members of a given structure, providing functions that know how to interact with the structure data, thereby achieving a perfect encapsulation of the underlying information </a:t>
+            </a:r>
           </a:p>
           <a:p>
             <a:r>

</xml_diff>